<commit_message>
Important Docs Update to PPT 2-29-24
</commit_message>
<xml_diff>
--- a/wwwroot/GAPMoblize_Project_Final_3_1_2024.pptx
+++ b/wwwroot/GAPMoblize_Project_Final_3_1_2024.pptx
@@ -144,7 +144,7 @@
       <p15:sldGuideLst xmlns:p15="http://schemas.microsoft.com/office/powerpoint/2012/main"/>
     </p:ext>
     <p:ext uri="GoogleSlidesCustomDataVersion2">
-      <go:slidesCustomData xmlns="" xmlns:mc="http://schemas.openxmlformats.org/markup-compatibility/2006" xmlns:mv="urn:schemas-microsoft-com:mac:vml" xmlns:c="http://schemas.openxmlformats.org/drawingml/2006/chart" xmlns:dgm="http://schemas.openxmlformats.org/drawingml/2006/diagram" xmlns:o="urn:schemas-microsoft-com:office:office" xmlns:v="urn:schemas-microsoft-com:vml" xmlns:pvml="urn:schemas-microsoft-com:office:powerpoint" xmlns:com="http://schemas.openxmlformats.org/drawingml/2006/compatibility" xmlns:p14="http://schemas.microsoft.com/office/powerpoint/2010/main" xmlns:p15="http://schemas.microsoft.com/office/powerpoint/2012/main" xmlns:ahyp="http://schemas.microsoft.com/office/drawing/2018/hyperlinkcolor" xmlns:go="http://customooxmlschemas.google.com/" r:id="rId29" roundtripDataSignature="AMtx7mhGT3lbFy52I47qpUfcLgyjprfeZQ=="/>
+      <go:slidesCustomData xmlns:go="http://customooxmlschemas.google.com/" xmlns:ahyp="http://schemas.microsoft.com/office/drawing/2018/hyperlinkcolor" xmlns:p15="http://schemas.microsoft.com/office/powerpoint/2012/main" xmlns:p14="http://schemas.microsoft.com/office/powerpoint/2010/main" xmlns:com="http://schemas.openxmlformats.org/drawingml/2006/compatibility" xmlns:pvml="urn:schemas-microsoft-com:office:powerpoint" xmlns:v="urn:schemas-microsoft-com:vml" xmlns:o="urn:schemas-microsoft-com:office:office" xmlns:dgm="http://schemas.openxmlformats.org/drawingml/2006/diagram" xmlns:c="http://schemas.openxmlformats.org/drawingml/2006/chart" xmlns:mv="urn:schemas-microsoft-com:mac:vml" xmlns:mc="http://schemas.openxmlformats.org/markup-compatibility/2006" xmlns="" r:id="rId29" roundtripDataSignature="AMtx7mhGT3lbFy52I47qpUfcLgyjprfeZQ=="/>
     </p:ext>
   </p:extLst>
 </p:presentation>
@@ -163,7 +163,7 @@
   <pc:docChgLst>
     <pc:chgData name="Greg Leake" userId="32827faac32acba3" providerId="LiveId" clId="{8656EB85-3D90-49AE-A343-8BFE0CE0C18E}"/>
     <pc:docChg chg="undo custSel addSld delSld modSld sldOrd">
-      <pc:chgData name="Greg Leake" userId="32827faac32acba3" providerId="LiveId" clId="{8656EB85-3D90-49AE-A343-8BFE0CE0C18E}" dt="2024-02-29T19:47:10.746" v="2683" actId="20577"/>
+      <pc:chgData name="Greg Leake" userId="32827faac32acba3" providerId="LiveId" clId="{8656EB85-3D90-49AE-A343-8BFE0CE0C18E}" dt="2024-02-29T23:58:14.703" v="2880" actId="20577"/>
       <pc:docMkLst>
         <pc:docMk/>
       </pc:docMkLst>
@@ -481,7 +481,7 @@
         </pc:spChg>
       </pc:sldChg>
       <pc:sldChg chg="addSp delSp modSp add mod setBg">
-        <pc:chgData name="Greg Leake" userId="32827faac32acba3" providerId="LiveId" clId="{8656EB85-3D90-49AE-A343-8BFE0CE0C18E}" dt="2024-02-29T17:48:09.110" v="2133" actId="113"/>
+        <pc:chgData name="Greg Leake" userId="32827faac32acba3" providerId="LiveId" clId="{8656EB85-3D90-49AE-A343-8BFE0CE0C18E}" dt="2024-02-29T23:58:14.703" v="2880" actId="20577"/>
         <pc:sldMkLst>
           <pc:docMk/>
           <pc:sldMk cId="911994264" sldId="284"/>
@@ -495,7 +495,7 @@
           </ac:spMkLst>
         </pc:spChg>
         <pc:spChg chg="mod">
-          <ac:chgData name="Greg Leake" userId="32827faac32acba3" providerId="LiveId" clId="{8656EB85-3D90-49AE-A343-8BFE0CE0C18E}" dt="2024-02-29T17:42:30.380" v="1866" actId="255"/>
+          <ac:chgData name="Greg Leake" userId="32827faac32acba3" providerId="LiveId" clId="{8656EB85-3D90-49AE-A343-8BFE0CE0C18E}" dt="2024-02-29T23:58:14.703" v="2880" actId="20577"/>
           <ac:spMkLst>
             <pc:docMk/>
             <pc:sldMk cId="911994264" sldId="284"/>
@@ -12552,12 +12552,36 @@
               </a:lnSpc>
             </a:pPr>
             <a:r>
+              <a:rPr lang="en-US" sz="1700" b="1" dirty="0">
+                <a:solidFill>
+                  <a:schemeClr val="bg1"/>
+                </a:solidFill>
+              </a:rPr>
+              <a:t>Helped</a:t>
+            </a:r>
+            <a:r>
               <a:rPr lang="en-US" sz="1700" dirty="0">
                 <a:solidFill>
                   <a:schemeClr val="bg1"/>
                 </a:solidFill>
               </a:rPr>
-              <a:t>Helped with HTML formatting/CSS generation</a:t>
+              <a:t> tremendously in </a:t>
+            </a:r>
+            <a:r>
+              <a:rPr lang="en-US" sz="1700" b="1" dirty="0">
+                <a:solidFill>
+                  <a:schemeClr val="bg1"/>
+                </a:solidFill>
+              </a:rPr>
+              <a:t>DEBUG/runtime fixing </a:t>
+            </a:r>
+            <a:r>
+              <a:rPr lang="en-US" sz="1700" dirty="0">
+                <a:solidFill>
+                  <a:schemeClr val="bg1"/>
+                </a:solidFill>
+              </a:rPr>
+              <a:t>not just code migrations   </a:t>
             </a:r>
           </a:p>
           <a:p>
@@ -12572,7 +12596,15 @@
                   <a:schemeClr val="bg1"/>
                 </a:solidFill>
               </a:rPr>
-              <a:t>Great database model classes from DDL</a:t>
+              <a:t>Could use for </a:t>
+            </a:r>
+            <a:r>
+              <a:rPr lang="en-US" sz="1700" b="1" dirty="0">
+                <a:solidFill>
+                  <a:schemeClr val="bg1"/>
+                </a:solidFill>
+              </a:rPr>
+              <a:t>any source/target platform/language</a:t>
             </a:r>
           </a:p>
           <a:p>
@@ -12582,12 +12614,36 @@
               </a:lnSpc>
             </a:pPr>
             <a:r>
+              <a:rPr lang="en-US" sz="1700" dirty="0">
+                <a:solidFill>
+                  <a:schemeClr val="bg1"/>
+                </a:solidFill>
+              </a:rPr>
+              <a:t>See extra interaction ex: Re Targeting </a:t>
+            </a:r>
+            <a:r>
               <a:rPr lang="en-US" sz="1700" b="1" dirty="0">
                 <a:solidFill>
                   <a:schemeClr val="bg1"/>
                 </a:solidFill>
               </a:rPr>
-              <a:t>Helped tremendously in DEBUG/runtime fixing   </a:t>
+              <a:t>Node.JS </a:t>
+            </a:r>
+            <a:r>
+              <a:rPr lang="en-US" sz="1700" dirty="0">
+                <a:solidFill>
+                  <a:schemeClr val="bg1"/>
+                </a:solidFill>
+              </a:rPr>
+              <a:t>and </a:t>
+            </a:r>
+            <a:r>
+              <a:rPr lang="en-US" sz="1700" b="1" dirty="0">
+                <a:solidFill>
+                  <a:schemeClr val="bg1"/>
+                </a:solidFill>
+              </a:rPr>
+              <a:t>Angular</a:t>
             </a:r>
           </a:p>
           <a:p>
@@ -12602,15 +12658,38 @@
                   <a:schemeClr val="bg1"/>
                 </a:solidFill>
               </a:rPr>
-              <a:t>Could use for </a:t>
-            </a:r>
-            <a:r>
-              <a:rPr lang="en-US" sz="1700" b="1" dirty="0">
-                <a:solidFill>
-                  <a:schemeClr val="bg1"/>
-                </a:solidFill>
-              </a:rPr>
-              <a:t>any source/target platform/language</a:t>
+              <a:t>Possibilities seem almost endless</a:t>
+            </a:r>
+          </a:p>
+          <a:p>
+            <a:pPr>
+              <a:lnSpc>
+                <a:spcPct val="100000"/>
+              </a:lnSpc>
+            </a:pPr>
+            <a:r>
+              <a:rPr lang="en-US" sz="1700" dirty="0">
+                <a:solidFill>
+                  <a:schemeClr val="bg1"/>
+                </a:solidFill>
+              </a:rPr>
+              <a:t>And polite, private, no “</a:t>
+            </a:r>
+            <a:r>
+              <a:rPr lang="en-US" sz="1700" dirty="0" err="1">
+                <a:solidFill>
+                  <a:schemeClr val="bg1"/>
+                </a:solidFill>
+              </a:rPr>
+              <a:t>snarkiness</a:t>
+            </a:r>
+            <a:r>
+              <a:rPr lang="en-US" sz="1700" dirty="0">
+                <a:solidFill>
+                  <a:schemeClr val="bg1"/>
+                </a:solidFill>
+              </a:rPr>
+              <a:t>”/online abuse</a:t>
             </a:r>
           </a:p>
         </p:txBody>

</xml_diff>

<commit_message>
Update PPT Presentation 3-1-24
</commit_message>
<xml_diff>
--- a/wwwroot/GAPMoblize_Project_Final_3_1_2024.pptx
+++ b/wwwroot/GAPMoblize_Project_Final_3_1_2024.pptx
@@ -5,43 +5,44 @@
     <p:sldMasterId id="2147483666" r:id="rId1"/>
   </p:sldMasterIdLst>
   <p:notesMasterIdLst>
-    <p:notesMasterId r:id="rId21"/>
+    <p:notesMasterId r:id="rId22"/>
   </p:notesMasterIdLst>
   <p:sldIdLst>
-    <p:sldId id="256" r:id="rId2"/>
-    <p:sldId id="257" r:id="rId3"/>
-    <p:sldId id="270" r:id="rId4"/>
-    <p:sldId id="276" r:id="rId5"/>
-    <p:sldId id="284" r:id="rId6"/>
-    <p:sldId id="281" r:id="rId7"/>
-    <p:sldId id="272" r:id="rId8"/>
-    <p:sldId id="278" r:id="rId9"/>
-    <p:sldId id="279" r:id="rId10"/>
-    <p:sldId id="280" r:id="rId11"/>
-    <p:sldId id="271" r:id="rId12"/>
-    <p:sldId id="266" r:id="rId13"/>
-    <p:sldId id="274" r:id="rId14"/>
-    <p:sldId id="275" r:id="rId15"/>
-    <p:sldId id="277" r:id="rId16"/>
-    <p:sldId id="273" r:id="rId17"/>
-    <p:sldId id="282" r:id="rId18"/>
-    <p:sldId id="269" r:id="rId19"/>
-    <p:sldId id="260" r:id="rId20"/>
+    <p:sldId id="285" r:id="rId2"/>
+    <p:sldId id="256" r:id="rId3"/>
+    <p:sldId id="257" r:id="rId4"/>
+    <p:sldId id="270" r:id="rId5"/>
+    <p:sldId id="276" r:id="rId6"/>
+    <p:sldId id="284" r:id="rId7"/>
+    <p:sldId id="281" r:id="rId8"/>
+    <p:sldId id="272" r:id="rId9"/>
+    <p:sldId id="278" r:id="rId10"/>
+    <p:sldId id="279" r:id="rId11"/>
+    <p:sldId id="280" r:id="rId12"/>
+    <p:sldId id="271" r:id="rId13"/>
+    <p:sldId id="266" r:id="rId14"/>
+    <p:sldId id="274" r:id="rId15"/>
+    <p:sldId id="275" r:id="rId16"/>
+    <p:sldId id="277" r:id="rId17"/>
+    <p:sldId id="273" r:id="rId18"/>
+    <p:sldId id="282" r:id="rId19"/>
+    <p:sldId id="269" r:id="rId20"/>
+    <p:sldId id="260" r:id="rId21"/>
   </p:sldIdLst>
   <p:sldSz cx="12192000" cy="6858000"/>
   <p:notesSz cx="6858000" cy="9144000"/>
   <p:embeddedFontLst>
     <p:embeddedFont>
       <p:font typeface="Century Gothic" panose="020B0502020202020204" pitchFamily="34" charset="0"/>
-      <p:regular r:id="rId22"/>
-      <p:bold r:id="rId23"/>
-      <p:italic r:id="rId24"/>
-      <p:boldItalic r:id="rId25"/>
+      <p:regular r:id="rId23"/>
+      <p:bold r:id="rId24"/>
+      <p:italic r:id="rId25"/>
+      <p:boldItalic r:id="rId26"/>
     </p:embeddedFont>
     <p:embeddedFont>
       <p:font typeface="Play" panose="020B0604020202020204" charset="0"/>
-      <p:regular r:id="rId26"/>
-      <p:bold r:id="rId27"/>
+      <p:regular r:id="rId27"/>
+      <p:bold r:id="rId28"/>
     </p:embeddedFont>
   </p:embeddedFontLst>
   <p:defaultTextStyle>
@@ -144,7 +145,7 @@
       <p15:sldGuideLst xmlns:p15="http://schemas.microsoft.com/office/powerpoint/2012/main"/>
     </p:ext>
     <p:ext uri="GoogleSlidesCustomDataVersion2">
-      <go:slidesCustomData xmlns:go="http://customooxmlschemas.google.com/" xmlns:ahyp="http://schemas.microsoft.com/office/drawing/2018/hyperlinkcolor" xmlns:p15="http://schemas.microsoft.com/office/powerpoint/2012/main" xmlns:p14="http://schemas.microsoft.com/office/powerpoint/2010/main" xmlns:com="http://schemas.openxmlformats.org/drawingml/2006/compatibility" xmlns:pvml="urn:schemas-microsoft-com:office:powerpoint" xmlns:v="urn:schemas-microsoft-com:vml" xmlns:o="urn:schemas-microsoft-com:office:office" xmlns:dgm="http://schemas.openxmlformats.org/drawingml/2006/diagram" xmlns:c="http://schemas.openxmlformats.org/drawingml/2006/chart" xmlns:mv="urn:schemas-microsoft-com:mac:vml" xmlns:mc="http://schemas.openxmlformats.org/markup-compatibility/2006" xmlns="" r:id="rId29" roundtripDataSignature="AMtx7mhGT3lbFy52I47qpUfcLgyjprfeZQ=="/>
+      <go:slidesCustomData xmlns="" xmlns:mc="http://schemas.openxmlformats.org/markup-compatibility/2006" xmlns:mv="urn:schemas-microsoft-com:mac:vml" xmlns:c="http://schemas.openxmlformats.org/drawingml/2006/chart" xmlns:dgm="http://schemas.openxmlformats.org/drawingml/2006/diagram" xmlns:o="urn:schemas-microsoft-com:office:office" xmlns:v="urn:schemas-microsoft-com:vml" xmlns:pvml="urn:schemas-microsoft-com:office:powerpoint" xmlns:com="http://schemas.openxmlformats.org/drawingml/2006/compatibility" xmlns:p14="http://schemas.microsoft.com/office/powerpoint/2010/main" xmlns:p15="http://schemas.microsoft.com/office/powerpoint/2012/main" xmlns:ahyp="http://schemas.microsoft.com/office/drawing/2018/hyperlinkcolor" xmlns:go="http://customooxmlschemas.google.com/" r:id="rId29" roundtripDataSignature="AMtx7mhGT3lbFy52I47qpUfcLgyjprfeZQ=="/>
     </p:ext>
   </p:extLst>
 </p:presentation>
@@ -153,7 +154,7 @@
 <file path=ppt/revisionInfo.xml><?xml version="1.0" encoding="utf-8"?>
 <p1510:revInfo xmlns:a="http://schemas.openxmlformats.org/drawingml/2006/main" xmlns:r="http://schemas.openxmlformats.org/officeDocument/2006/relationships" xmlns:p1510="http://schemas.microsoft.com/office/powerpoint/2015/10/main">
   <p1510:revLst>
-    <p1510:client id="{8656EB85-3D90-49AE-A343-8BFE0CE0C18E}" v="47" dt="2024-02-29T19:42:06.162"/>
+    <p1510:client id="{8656EB85-3D90-49AE-A343-8BFE0CE0C18E}" v="49" dt="2024-03-01T15:34:15.353"/>
   </p1510:revLst>
 </p1510:revInfo>
 </file>
@@ -163,7 +164,7 @@
   <pc:docChgLst>
     <pc:chgData name="Greg Leake" userId="32827faac32acba3" providerId="LiveId" clId="{8656EB85-3D90-49AE-A343-8BFE0CE0C18E}"/>
     <pc:docChg chg="undo custSel addSld delSld modSld sldOrd">
-      <pc:chgData name="Greg Leake" userId="32827faac32acba3" providerId="LiveId" clId="{8656EB85-3D90-49AE-A343-8BFE0CE0C18E}" dt="2024-02-29T23:58:14.703" v="2880" actId="20577"/>
+      <pc:chgData name="Greg Leake" userId="32827faac32acba3" providerId="LiveId" clId="{8656EB85-3D90-49AE-A343-8BFE0CE0C18E}" dt="2024-03-01T15:34:15.353" v="2882"/>
       <pc:docMkLst>
         <pc:docMk/>
       </pc:docMkLst>
@@ -555,6 +556,13 @@
         <pc:sldMkLst>
           <pc:docMk/>
           <pc:sldMk cId="2508954865" sldId="284"/>
+        </pc:sldMkLst>
+      </pc:sldChg>
+      <pc:sldChg chg="add setBg">
+        <pc:chgData name="Greg Leake" userId="32827faac32acba3" providerId="LiveId" clId="{8656EB85-3D90-49AE-A343-8BFE0CE0C18E}" dt="2024-03-01T15:34:15.353" v="2882"/>
+        <pc:sldMkLst>
+          <pc:docMk/>
+          <pc:sldMk cId="0" sldId="285"/>
         </pc:sldMkLst>
       </pc:sldChg>
     </pc:docChg>
@@ -3812,6 +3820,128 @@
   <p:cSld>
     <p:spTree>
       <p:nvGrpSpPr>
+        <p:cNvPr id="1" name="Shape 149"/>
+        <p:cNvGrpSpPr/>
+        <p:nvPr/>
+      </p:nvGrpSpPr>
+      <p:grpSpPr>
+        <a:xfrm>
+          <a:off x="0" y="0"/>
+          <a:ext cx="0" cy="0"/>
+          <a:chOff x="0" y="0"/>
+          <a:chExt cx="0" cy="0"/>
+        </a:xfrm>
+      </p:grpSpPr>
+      <p:sp>
+        <p:nvSpPr>
+          <p:cNvPr id="150" name="Google Shape;150;p2:notes"/>
+          <p:cNvSpPr txBox="1">
+            <a:spLocks noGrp="1"/>
+          </p:cNvSpPr>
+          <p:nvPr>
+            <p:ph type="body" idx="1"/>
+          </p:nvPr>
+        </p:nvSpPr>
+        <p:spPr>
+          <a:xfrm>
+            <a:off x="685800" y="4343400"/>
+            <a:ext cx="5486400" cy="4114800"/>
+          </a:xfrm>
+          <a:prstGeom prst="rect">
+            <a:avLst/>
+          </a:prstGeom>
+          <a:noFill/>
+          <a:ln>
+            <a:noFill/>
+          </a:ln>
+        </p:spPr>
+        <p:txBody>
+          <a:bodyPr spcFirstLastPara="1" wrap="square" lIns="91425" tIns="91425" rIns="91425" bIns="91425" anchor="t" anchorCtr="0">
+            <a:noAutofit/>
+          </a:bodyPr>
+          <a:lstStyle/>
+          <a:p>
+            <a:pPr marL="0" lvl="0" indent="0" algn="l" rtl="0">
+              <a:lnSpc>
+                <a:spcPct val="100000"/>
+              </a:lnSpc>
+              <a:spcBef>
+                <a:spcPts val="0"/>
+              </a:spcBef>
+              <a:spcAft>
+                <a:spcPts val="0"/>
+              </a:spcAft>
+              <a:buSzPts val="1100"/>
+              <a:buNone/>
+            </a:pPr>
+            <a:endParaRPr dirty="0"/>
+          </a:p>
+        </p:txBody>
+      </p:sp>
+      <p:sp>
+        <p:nvSpPr>
+          <p:cNvPr id="151" name="Google Shape;151;p2:notes"/>
+          <p:cNvSpPr>
+            <a:spLocks noGrp="1" noRot="1" noChangeAspect="1"/>
+          </p:cNvSpPr>
+          <p:nvPr>
+            <p:ph type="sldImg" idx="2"/>
+          </p:nvPr>
+        </p:nvSpPr>
+        <p:spPr>
+          <a:xfrm>
+            <a:off x="381000" y="685800"/>
+            <a:ext cx="6096000" cy="3429000"/>
+          </a:xfrm>
+          <a:custGeom>
+            <a:avLst/>
+            <a:gdLst/>
+            <a:ahLst/>
+            <a:cxnLst/>
+            <a:rect l="l" t="t" r="r" b="b"/>
+            <a:pathLst>
+              <a:path w="120000" h="120000" extrusionOk="0">
+                <a:moveTo>
+                  <a:pt x="0" y="0"/>
+                </a:moveTo>
+                <a:lnTo>
+                  <a:pt x="120000" y="0"/>
+                </a:lnTo>
+                <a:lnTo>
+                  <a:pt x="120000" y="120000"/>
+                </a:lnTo>
+                <a:lnTo>
+                  <a:pt x="0" y="120000"/>
+                </a:lnTo>
+                <a:close/>
+              </a:path>
+            </a:pathLst>
+          </a:custGeom>
+          <a:noFill/>
+          <a:ln w="9525" cap="flat" cmpd="sng">
+            <a:solidFill>
+              <a:srgbClr val="000000"/>
+            </a:solidFill>
+            <a:prstDash val="solid"/>
+            <a:round/>
+            <a:headEnd type="none" w="sm" len="sm"/>
+            <a:tailEnd type="none" w="sm" len="sm"/>
+          </a:ln>
+        </p:spPr>
+      </p:sp>
+    </p:spTree>
+  </p:cSld>
+  <p:clrMapOvr>
+    <a:masterClrMapping/>
+  </p:clrMapOvr>
+</p:notes>
+</file>
+
+<file path=ppt/notesSlides/notesSlide2.xml><?xml version="1.0" encoding="utf-8"?>
+<p:notes xmlns:a="http://schemas.openxmlformats.org/drawingml/2006/main" xmlns:r="http://schemas.openxmlformats.org/officeDocument/2006/relationships" xmlns:p="http://schemas.openxmlformats.org/presentationml/2006/main" showMasterSp="0" showMasterPhAnim="0">
+  <p:cSld>
+    <p:spTree>
+      <p:nvGrpSpPr>
         <p:cNvPr id="1" name="Shape 143"/>
         <p:cNvGrpSpPr/>
         <p:nvPr/>
@@ -3929,7 +4059,7 @@
 </p:notes>
 </file>
 
-<file path=ppt/notesSlides/notesSlide2.xml><?xml version="1.0" encoding="utf-8"?>
+<file path=ppt/notesSlides/notesSlide3.xml><?xml version="1.0" encoding="utf-8"?>
 <p:notes xmlns:a="http://schemas.openxmlformats.org/drawingml/2006/main" xmlns:r="http://schemas.openxmlformats.org/officeDocument/2006/relationships" xmlns:p="http://schemas.openxmlformats.org/presentationml/2006/main" showMasterSp="0" showMasterPhAnim="0">
   <p:cSld>
     <p:spTree>
@@ -4051,7 +4181,7 @@
 </p:notes>
 </file>
 
-<file path=ppt/notesSlides/notesSlide3.xml><?xml version="1.0" encoding="utf-8"?>
+<file path=ppt/notesSlides/notesSlide4.xml><?xml version="1.0" encoding="utf-8"?>
 <p:notes xmlns:a="http://schemas.openxmlformats.org/drawingml/2006/main" xmlns:r="http://schemas.openxmlformats.org/officeDocument/2006/relationships" xmlns:p="http://schemas.openxmlformats.org/presentationml/2006/main" showMasterSp="0" showMasterPhAnim="0">
   <p:cSld>
     <p:spTree>
@@ -7204,7 +7334,7 @@
     </p:bg>
     <p:spTree>
       <p:nvGrpSpPr>
-        <p:cNvPr id="1" name="Shape 146"/>
+        <p:cNvPr id="1" name="Shape 152"/>
         <p:cNvGrpSpPr/>
         <p:nvPr/>
       </p:nvGrpSpPr>
@@ -7218,18 +7348,18 @@
       </p:grpSpPr>
       <p:sp>
         <p:nvSpPr>
-          <p:cNvPr id="147" name="Google Shape;147;p1"/>
+          <p:cNvPr id="153" name="Google Shape;153;p2"/>
           <p:cNvSpPr txBox="1">
             <a:spLocks noGrp="1"/>
           </p:cNvSpPr>
           <p:nvPr>
-            <p:ph type="ctrTitle"/>
+            <p:ph type="title"/>
           </p:nvPr>
         </p:nvSpPr>
         <p:spPr>
           <a:xfrm>
-            <a:off x="814848" y="1926814"/>
-            <a:ext cx="10333703" cy="1581508"/>
+            <a:off x="523598" y="75157"/>
+            <a:ext cx="11548997" cy="892757"/>
           </a:xfrm>
           <a:prstGeom prst="rect">
             <a:avLst/>
@@ -7240,12 +7370,12 @@
           </a:ln>
         </p:spPr>
         <p:txBody>
-          <a:bodyPr spcFirstLastPara="1" wrap="square" lIns="91425" tIns="45700" rIns="91425" bIns="45700" anchor="b" anchorCtr="0">
-            <a:normAutofit fontScale="90000"/>
+          <a:bodyPr spcFirstLastPara="1" wrap="square" lIns="91425" tIns="45700" rIns="91425" bIns="45700" anchor="t" anchorCtr="0">
+            <a:noAutofit/>
           </a:bodyPr>
           <a:lstStyle/>
           <a:p>
-            <a:pPr marL="0" lvl="0" indent="0" rtl="0">
+            <a:pPr marL="0" lvl="0" indent="0" algn="l" rtl="0">
               <a:lnSpc>
                 <a:spcPct val="100000"/>
               </a:lnSpc>
@@ -7258,64 +7388,19 @@
               <a:buClr>
                 <a:schemeClr val="lt2"/>
               </a:buClr>
-              <a:buSzPts val="7200"/>
+              <a:buSzPts val="4200"/>
               <a:buFont typeface="Century Gothic"/>
               <a:buNone/>
             </a:pPr>
             <a:r>
-              <a:rPr lang="en-US" sz="4400" dirty="0">
-                <a:solidFill>
-                  <a:schemeClr val="bg1"/>
-                </a:solidFill>
-              </a:rPr>
-              <a:t>Using ChatGPT 4.0 To Migrate a VB.NET Windows Forms Application to a </a:t>
-            </a:r>
-            <a:br>
-              <a:rPr lang="en-US" sz="4400" dirty="0">
-                <a:solidFill>
-                  <a:schemeClr val="bg1"/>
-                </a:solidFill>
-              </a:rPr>
-            </a:br>
-            <a:r>
-              <a:rPr lang="en-US" sz="4400" dirty="0">
-                <a:solidFill>
-                  <a:schemeClr val="bg1"/>
-                </a:solidFill>
-              </a:rPr>
-              <a:t>C# Blazor Web Application</a:t>
-            </a:r>
-            <a:br>
-              <a:rPr lang="en-US" sz="4000" dirty="0">
-                <a:solidFill>
-                  <a:schemeClr val="bg1"/>
-                </a:solidFill>
-              </a:rPr>
-            </a:br>
-            <a:r>
-              <a:rPr lang="en-US" sz="3100" i="1" dirty="0">
-                <a:solidFill>
-                  <a:schemeClr val="bg1"/>
-                </a:solidFill>
-              </a:rPr>
-              <a:t>An Application Modernization Experiment </a:t>
-            </a:r>
-            <a:br>
-              <a:rPr lang="en-US" sz="3100" i="1" dirty="0">
-                <a:solidFill>
-                  <a:schemeClr val="bg1"/>
-                </a:solidFill>
-              </a:rPr>
-            </a:br>
-            <a:r>
-              <a:rPr lang="en-US" sz="3100" i="1" dirty="0">
-                <a:solidFill>
-                  <a:schemeClr val="bg1"/>
-                </a:solidFill>
-              </a:rPr>
-              <a:t>For Gap Mobilize</a:t>
-            </a:r>
-            <a:endParaRPr sz="3100" i="1" dirty="0">
+              <a:rPr lang="en-US" sz="3200" dirty="0">
+                <a:solidFill>
+                  <a:schemeClr val="bg1"/>
+                </a:solidFill>
+              </a:rPr>
+              <a:t>Intro: Generative AI is our biggest threat &amp; our biggest opportunity</a:t>
+            </a:r>
+            <a:endParaRPr sz="3200" dirty="0">
               <a:solidFill>
                 <a:schemeClr val="bg1"/>
               </a:solidFill>
@@ -7325,18 +7410,18 @@
       </p:sp>
       <p:sp>
         <p:nvSpPr>
-          <p:cNvPr id="148" name="Google Shape;148;p1"/>
+          <p:cNvPr id="154" name="Google Shape;154;p2"/>
           <p:cNvSpPr txBox="1">
             <a:spLocks noGrp="1"/>
           </p:cNvSpPr>
           <p:nvPr>
-            <p:ph type="subTitle" idx="1"/>
+            <p:ph idx="1"/>
           </p:nvPr>
         </p:nvSpPr>
         <p:spPr>
           <a:xfrm>
-            <a:off x="1409699" y="4721636"/>
-            <a:ext cx="9144000" cy="1058452"/>
+            <a:off x="321501" y="1088858"/>
+            <a:ext cx="11548997" cy="5191411"/>
           </a:xfrm>
           <a:prstGeom prst="rect">
             <a:avLst/>
@@ -7352,7 +7437,7 @@
           </a:bodyPr>
           <a:lstStyle/>
           <a:p>
-            <a:pPr marL="0" lvl="0" indent="0" rtl="0">
+            <a:pPr lvl="0" algn="l" rtl="0">
               <a:lnSpc>
                 <a:spcPct val="100000"/>
               </a:lnSpc>
@@ -7362,35 +7447,316 @@
               <a:spcAft>
                 <a:spcPts val="0"/>
               </a:spcAft>
-              <a:buSzPts val="1600"/>
-              <a:buNone/>
+              <a:buSzPct val="79999"/>
             </a:pPr>
             <a:r>
+              <a:rPr lang="en-US" sz="2400" dirty="0">
+                <a:solidFill>
+                  <a:schemeClr val="bg1"/>
+                </a:solidFill>
+                <a:ea typeface="Arial"/>
+                <a:cs typeface="Arial"/>
+                <a:sym typeface="Arial"/>
+              </a:rPr>
+              <a:t>Typical GAP Migration Customer</a:t>
+            </a:r>
+            <a:endParaRPr sz="2000" dirty="0">
+              <a:solidFill>
+                <a:schemeClr val="bg1"/>
+              </a:solidFill>
+            </a:endParaRPr>
+          </a:p>
+          <a:p>
+            <a:pPr lvl="1" algn="l" rtl="0">
+              <a:lnSpc>
+                <a:spcPct val="100000"/>
+              </a:lnSpc>
+              <a:spcBef>
+                <a:spcPts val="1000"/>
+              </a:spcBef>
+              <a:spcAft>
+                <a:spcPts val="0"/>
+              </a:spcAft>
+              <a:buSzPct val="80000"/>
+            </a:pPr>
+            <a:r>
+              <a:rPr lang="en-US" sz="1800" b="1" dirty="0">
+                <a:solidFill>
+                  <a:schemeClr val="bg1"/>
+                </a:solidFill>
+                <a:cs typeface="Arial"/>
+                <a:sym typeface="Arial"/>
+              </a:rPr>
+              <a:t>Boss to smart &amp; influential developer: “</a:t>
+            </a:r>
+            <a:r>
               <a:rPr lang="en-US" sz="1800" dirty="0">
                 <a:solidFill>
                   <a:schemeClr val="bg1"/>
                 </a:solidFill>
-              </a:rPr>
-              <a:t>Prepared by Gregory Leake</a:t>
-            </a:r>
-            <a:br>
+                <a:cs typeface="Arial"/>
+                <a:sym typeface="Arial"/>
+              </a:rPr>
+              <a:t>Figure out how to migrate this old VB app”</a:t>
+            </a:r>
+            <a:endParaRPr sz="1800" dirty="0">
+              <a:solidFill>
+                <a:schemeClr val="bg1"/>
+              </a:solidFill>
+            </a:endParaRPr>
+          </a:p>
+          <a:p>
+            <a:pPr lvl="1" algn="l" rtl="0">
+              <a:lnSpc>
+                <a:spcPct val="100000"/>
+              </a:lnSpc>
+              <a:spcBef>
+                <a:spcPts val="1000"/>
+              </a:spcBef>
+              <a:spcAft>
+                <a:spcPts val="0"/>
+              </a:spcAft>
+              <a:buSzPct val="80000"/>
+            </a:pPr>
+            <a:r>
               <a:rPr lang="en-US" sz="1800" dirty="0">
                 <a:solidFill>
                   <a:schemeClr val="bg1"/>
                 </a:solidFill>
-              </a:rPr>
-            </a:br>
+                <a:ea typeface="Arial"/>
+                <a:cs typeface="Arial"/>
+                <a:sym typeface="Arial"/>
+              </a:rPr>
+              <a:t>Smart &amp; influential developer</a:t>
+            </a:r>
+          </a:p>
+          <a:p>
+            <a:pPr lvl="2">
+              <a:lnSpc>
+                <a:spcPct val="100000"/>
+              </a:lnSpc>
+              <a:spcBef>
+                <a:spcPts val="1000"/>
+              </a:spcBef>
+              <a:buSzPct val="80000"/>
+            </a:pPr>
+            <a:r>
+              <a:rPr lang="en-US" sz="1400" dirty="0">
+                <a:solidFill>
+                  <a:schemeClr val="bg1"/>
+                </a:solidFill>
+                <a:ea typeface="Arial"/>
+                <a:cs typeface="Arial"/>
+                <a:sym typeface="Arial"/>
+              </a:rPr>
+              <a:t>Searches on Google for a solution</a:t>
+            </a:r>
+          </a:p>
+          <a:p>
+            <a:pPr lvl="2">
+              <a:lnSpc>
+                <a:spcPct val="100000"/>
+              </a:lnSpc>
+              <a:spcBef>
+                <a:spcPts val="1000"/>
+              </a:spcBef>
+              <a:buSzPct val="80000"/>
+            </a:pPr>
+            <a:r>
+              <a:rPr lang="en-US" sz="1400" dirty="0">
+                <a:solidFill>
+                  <a:schemeClr val="bg1"/>
+                </a:solidFill>
+                <a:ea typeface="Arial"/>
+                <a:cs typeface="Arial"/>
+                <a:sym typeface="Arial"/>
+              </a:rPr>
+              <a:t>Reads </a:t>
+            </a:r>
+            <a:r>
+              <a:rPr lang="en-US" sz="1400" dirty="0" err="1">
+                <a:solidFill>
+                  <a:schemeClr val="bg1"/>
+                </a:solidFill>
+                <a:ea typeface="Arial"/>
+                <a:cs typeface="Arial"/>
+                <a:sym typeface="Arial"/>
+              </a:rPr>
+              <a:t>StackOverflow</a:t>
+            </a:r>
+            <a:endParaRPr lang="en-US" sz="1400" dirty="0">
+              <a:solidFill>
+                <a:schemeClr val="bg1"/>
+              </a:solidFill>
+              <a:ea typeface="Arial"/>
+              <a:cs typeface="Arial"/>
+              <a:sym typeface="Arial"/>
+            </a:endParaRPr>
+          </a:p>
+          <a:p>
+            <a:pPr lvl="2">
+              <a:lnSpc>
+                <a:spcPct val="100000"/>
+              </a:lnSpc>
+              <a:spcBef>
+                <a:spcPts val="1000"/>
+              </a:spcBef>
+              <a:buSzPct val="80000"/>
+            </a:pPr>
+            <a:r>
+              <a:rPr lang="en-US" sz="1400" dirty="0">
+                <a:solidFill>
+                  <a:schemeClr val="bg1"/>
+                </a:solidFill>
+                <a:ea typeface="Arial"/>
+                <a:cs typeface="Arial"/>
+                <a:sym typeface="Arial"/>
+              </a:rPr>
+              <a:t>Goes to Microsoft Learn</a:t>
+            </a:r>
+          </a:p>
+          <a:p>
+            <a:pPr lvl="2">
+              <a:lnSpc>
+                <a:spcPct val="100000"/>
+              </a:lnSpc>
+              <a:spcBef>
+                <a:spcPts val="1000"/>
+              </a:spcBef>
+              <a:buSzPct val="80000"/>
+            </a:pPr>
+            <a:r>
+              <a:rPr lang="en-US" sz="1400" dirty="0">
+                <a:solidFill>
+                  <a:schemeClr val="bg1"/>
+                </a:solidFill>
+                <a:ea typeface="Arial"/>
+                <a:cs typeface="Arial"/>
+                <a:sym typeface="Arial"/>
+              </a:rPr>
+              <a:t>Talks with others at Microsoft conferences &amp; events</a:t>
+            </a:r>
+          </a:p>
+          <a:p>
+            <a:pPr lvl="2">
+              <a:lnSpc>
+                <a:spcPct val="100000"/>
+              </a:lnSpc>
+              <a:spcBef>
+                <a:spcPts val="1000"/>
+              </a:spcBef>
+              <a:buSzPct val="80000"/>
+            </a:pPr>
+            <a:r>
+              <a:rPr lang="en-US" sz="1400" dirty="0">
+                <a:solidFill>
+                  <a:schemeClr val="bg1"/>
+                </a:solidFill>
+                <a:ea typeface="Arial"/>
+                <a:cs typeface="Arial"/>
+                <a:sym typeface="Arial"/>
+              </a:rPr>
+              <a:t>Finds </a:t>
+            </a:r>
+            <a:r>
+              <a:rPr lang="en-US" sz="1400" dirty="0">
+                <a:solidFill>
+                  <a:schemeClr val="bg1"/>
+                </a:solidFill>
+                <a:ea typeface="Arial"/>
+                <a:cs typeface="Arial"/>
+                <a:sym typeface="Arial"/>
+                <a:hlinkClick r:id="rId3"/>
+              </a:rPr>
+              <a:t>www.mobilize.net</a:t>
+            </a:r>
+            <a:r>
+              <a:rPr lang="en-US" sz="1400" dirty="0">
+                <a:solidFill>
+                  <a:schemeClr val="bg1"/>
+                </a:solidFill>
+                <a:ea typeface="Arial"/>
+                <a:cs typeface="Arial"/>
+                <a:sym typeface="Arial"/>
+              </a:rPr>
+              <a:t> and either downloads a trial or requests help</a:t>
+            </a:r>
+          </a:p>
+          <a:p>
+            <a:pPr>
+              <a:lnSpc>
+                <a:spcPct val="100000"/>
+              </a:lnSpc>
+              <a:buSzPct val="80000"/>
+            </a:pPr>
+            <a:r>
+              <a:rPr lang="en-US" sz="2200" dirty="0">
+                <a:solidFill>
+                  <a:schemeClr val="bg1"/>
+                </a:solidFill>
+                <a:ea typeface="Arial"/>
+                <a:cs typeface="Arial"/>
+                <a:sym typeface="Arial"/>
+              </a:rPr>
+              <a:t>New Customer Journey</a:t>
+            </a:r>
+          </a:p>
+          <a:p>
+            <a:pPr lvl="1">
+              <a:lnSpc>
+                <a:spcPct val="100000"/>
+              </a:lnSpc>
+              <a:buSzPct val="80000"/>
+            </a:pPr>
             <a:r>
               <a:rPr lang="en-US" sz="1800" dirty="0">
                 <a:solidFill>
                   <a:schemeClr val="bg1"/>
                 </a:solidFill>
-              </a:rPr>
-              <a:t>For Gap Mobilize</a:t>
-            </a:r>
-          </a:p>
-          <a:p>
-            <a:pPr marL="0" lvl="0" indent="0" rtl="0">
+                <a:ea typeface="Arial"/>
+                <a:cs typeface="Arial"/>
+                <a:sym typeface="Arial"/>
+              </a:rPr>
+              <a:t>Boss to smart &amp; influential developer: “Figure out how to use ChatGPT to migrate this app”</a:t>
+            </a:r>
+          </a:p>
+          <a:p>
+            <a:pPr>
+              <a:lnSpc>
+                <a:spcPct val="100000"/>
+              </a:lnSpc>
+              <a:buSzPct val="80000"/>
+            </a:pPr>
+            <a:r>
+              <a:rPr lang="en-US" sz="2200" dirty="0">
+                <a:solidFill>
+                  <a:schemeClr val="bg1"/>
+                </a:solidFill>
+                <a:ea typeface="Arial"/>
+                <a:cs typeface="Arial"/>
+                <a:sym typeface="Arial"/>
+              </a:rPr>
+              <a:t>This project mimics the “New Customer Journey” to help us anticipate how to incorporate generative AI into our marketing, sales, engineering and delivery process</a:t>
+            </a:r>
+          </a:p>
+          <a:p>
+            <a:pPr>
+              <a:lnSpc>
+                <a:spcPct val="100000"/>
+              </a:lnSpc>
+              <a:buSzPct val="80000"/>
+            </a:pPr>
+            <a:endParaRPr lang="en-US" sz="2400" b="0" i="0" u="none" strike="noStrike" dirty="0">
+              <a:solidFill>
+                <a:schemeClr val="bg1"/>
+              </a:solidFill>
+              <a:ea typeface="Arial"/>
+              <a:cs typeface="Arial"/>
+              <a:sym typeface="Arial"/>
+            </a:endParaRPr>
+          </a:p>
+          <a:p>
+            <a:pPr marL="0" lvl="0" indent="0" algn="l" rtl="0">
               <a:lnSpc>
                 <a:spcPct val="100000"/>
               </a:lnSpc>
@@ -7400,21 +7766,17 @@
               <a:spcAft>
                 <a:spcPts val="0"/>
               </a:spcAft>
-              <a:buSzPts val="1600"/>
+              <a:buSzPct val="79999"/>
               <a:buNone/>
             </a:pPr>
-            <a:r>
-              <a:rPr lang="en-US" sz="1800" dirty="0">
-                <a:solidFill>
-                  <a:schemeClr val="bg1"/>
-                </a:solidFill>
-              </a:rPr>
-              <a:t>March 1, 2024</a:t>
-            </a:r>
-            <a:endParaRPr sz="1800" dirty="0">
+            <a:endParaRPr sz="1400" dirty="0">
               <a:solidFill>
                 <a:schemeClr val="bg1"/>
               </a:solidFill>
+              <a:latin typeface="Arial"/>
+              <a:ea typeface="Arial"/>
+              <a:cs typeface="Arial"/>
+              <a:sym typeface="Arial"/>
             </a:endParaRPr>
           </a:p>
         </p:txBody>
@@ -7428,6 +7790,113 @@
 </file>
 
 <file path=ppt/slides/slide10.xml><?xml version="1.0" encoding="utf-8"?>
+<p:sld xmlns:a="http://schemas.openxmlformats.org/drawingml/2006/main" xmlns:r="http://schemas.openxmlformats.org/officeDocument/2006/relationships" xmlns:p="http://schemas.openxmlformats.org/presentationml/2006/main">
+  <p:cSld>
+    <p:bg>
+      <p:bgPr>
+        <a:solidFill>
+          <a:schemeClr val="bg2">
+            <a:lumMod val="75000"/>
+          </a:schemeClr>
+        </a:solidFill>
+        <a:effectLst/>
+      </p:bgPr>
+    </p:bg>
+    <p:spTree>
+      <p:nvGrpSpPr>
+        <p:cNvPr id="1" name=""/>
+        <p:cNvGrpSpPr/>
+        <p:nvPr/>
+      </p:nvGrpSpPr>
+      <p:grpSpPr>
+        <a:xfrm>
+          <a:off x="0" y="0"/>
+          <a:ext cx="0" cy="0"/>
+          <a:chOff x="0" y="0"/>
+          <a:chExt cx="0" cy="0"/>
+        </a:xfrm>
+      </p:grpSpPr>
+      <p:sp>
+        <p:nvSpPr>
+          <p:cNvPr id="2" name="Title 1">
+            <a:extLst>
+              <a:ext uri="{FF2B5EF4-FFF2-40B4-BE49-F238E27FC236}">
+                <a16:creationId xmlns:a16="http://schemas.microsoft.com/office/drawing/2014/main" id="{FBA0E16C-0374-CCEA-7410-1F8354D8619E}"/>
+              </a:ext>
+            </a:extLst>
+          </p:cNvPr>
+          <p:cNvSpPr>
+            <a:spLocks noGrp="1"/>
+          </p:cNvSpPr>
+          <p:nvPr>
+            <p:ph type="title"/>
+          </p:nvPr>
+        </p:nvSpPr>
+        <p:spPr>
+          <a:xfrm>
+            <a:off x="838200" y="216568"/>
+            <a:ext cx="10515600" cy="895784"/>
+          </a:xfrm>
+        </p:spPr>
+        <p:txBody>
+          <a:bodyPr/>
+          <a:lstStyle/>
+          <a:p>
+            <a:r>
+              <a:rPr lang="en-US" dirty="0">
+                <a:solidFill>
+                  <a:schemeClr val="bg1"/>
+                </a:solidFill>
+              </a:rPr>
+              <a:t>ChatGPT Interaction Types</a:t>
+            </a:r>
+          </a:p>
+        </p:txBody>
+      </p:sp>
+      <p:graphicFrame>
+        <p:nvGraphicFramePr>
+          <p:cNvPr id="3" name="Chart 2">
+            <a:extLst>
+              <a:ext uri="{FF2B5EF4-FFF2-40B4-BE49-F238E27FC236}">
+                <a16:creationId xmlns:a16="http://schemas.microsoft.com/office/drawing/2014/main" id="{E7A81D9D-5365-62DD-A230-388B6B80482B}"/>
+              </a:ext>
+            </a:extLst>
+          </p:cNvPr>
+          <p:cNvGraphicFramePr>
+            <a:graphicFrameLocks/>
+          </p:cNvGraphicFramePr>
+          <p:nvPr>
+            <p:extLst>
+              <p:ext uri="{D42A27DB-BD31-4B8C-83A1-F6EECF244321}">
+                <p14:modId xmlns:p14="http://schemas.microsoft.com/office/powerpoint/2010/main" val="3251586984"/>
+              </p:ext>
+            </p:extLst>
+          </p:nvPr>
+        </p:nvGraphicFramePr>
+        <p:xfrm>
+          <a:off x="319314" y="1112352"/>
+          <a:ext cx="11618685" cy="5529080"/>
+        </p:xfrm>
+        <a:graphic>
+          <a:graphicData uri="http://schemas.openxmlformats.org/drawingml/2006/chart">
+            <c:chart xmlns:c="http://schemas.openxmlformats.org/drawingml/2006/chart" xmlns:r="http://schemas.openxmlformats.org/officeDocument/2006/relationships" r:id="rId2"/>
+          </a:graphicData>
+        </a:graphic>
+      </p:graphicFrame>
+    </p:spTree>
+    <p:extLst>
+      <p:ext uri="{BB962C8B-B14F-4D97-AF65-F5344CB8AC3E}">
+        <p14:creationId xmlns:p14="http://schemas.microsoft.com/office/powerpoint/2010/main" val="1680997173"/>
+      </p:ext>
+    </p:extLst>
+  </p:cSld>
+  <p:clrMapOvr>
+    <a:masterClrMapping/>
+  </p:clrMapOvr>
+</p:sld>
+</file>
+
+<file path=ppt/slides/slide11.xml><?xml version="1.0" encoding="utf-8"?>
 <p:sld xmlns:a="http://schemas.openxmlformats.org/drawingml/2006/main" xmlns:r="http://schemas.openxmlformats.org/officeDocument/2006/relationships" xmlns:p="http://schemas.openxmlformats.org/presentationml/2006/main">
   <p:cSld>
     <p:bg>
@@ -7732,7 +8201,7 @@
 </p:sld>
 </file>
 
-<file path=ppt/slides/slide11.xml><?xml version="1.0" encoding="utf-8"?>
+<file path=ppt/slides/slide12.xml><?xml version="1.0" encoding="utf-8"?>
 <p:sld xmlns:a="http://schemas.openxmlformats.org/drawingml/2006/main" xmlns:r="http://schemas.openxmlformats.org/officeDocument/2006/relationships" xmlns:p="http://schemas.openxmlformats.org/presentationml/2006/main">
   <p:cSld>
     <p:bg>
@@ -8046,7 +8515,7 @@
 </p:sld>
 </file>
 
-<file path=ppt/slides/slide12.xml><?xml version="1.0" encoding="utf-8"?>
+<file path=ppt/slides/slide13.xml><?xml version="1.0" encoding="utf-8"?>
 <p:sld xmlns:a="http://schemas.openxmlformats.org/drawingml/2006/main" xmlns:r="http://schemas.openxmlformats.org/officeDocument/2006/relationships" xmlns:p="http://schemas.openxmlformats.org/presentationml/2006/main">
   <p:cSld>
     <p:bg>
@@ -8198,7 +8667,7 @@
 </p:sld>
 </file>
 
-<file path=ppt/slides/slide13.xml><?xml version="1.0" encoding="utf-8"?>
+<file path=ppt/slides/slide14.xml><?xml version="1.0" encoding="utf-8"?>
 <p:sld xmlns:a="http://schemas.openxmlformats.org/drawingml/2006/main" xmlns:r="http://schemas.openxmlformats.org/officeDocument/2006/relationships" xmlns:p="http://schemas.openxmlformats.org/presentationml/2006/main">
   <p:cSld>
     <p:bg>
@@ -8467,7 +8936,7 @@
 </p:sld>
 </file>
 
-<file path=ppt/slides/slide14.xml><?xml version="1.0" encoding="utf-8"?>
+<file path=ppt/slides/slide15.xml><?xml version="1.0" encoding="utf-8"?>
 <p:sld xmlns:a="http://schemas.openxmlformats.org/drawingml/2006/main" xmlns:r="http://schemas.openxmlformats.org/officeDocument/2006/relationships" xmlns:p="http://schemas.openxmlformats.org/presentationml/2006/main">
   <p:cSld>
     <p:bg>
@@ -9064,7 +9533,7 @@
 </p:sld>
 </file>
 
-<file path=ppt/slides/slide15.xml><?xml version="1.0" encoding="utf-8"?>
+<file path=ppt/slides/slide16.xml><?xml version="1.0" encoding="utf-8"?>
 <p:sld xmlns:a="http://schemas.openxmlformats.org/drawingml/2006/main" xmlns:r="http://schemas.openxmlformats.org/officeDocument/2006/relationships" xmlns:p="http://schemas.openxmlformats.org/presentationml/2006/main">
   <p:cSld>
     <p:bg>
@@ -9142,7 +9611,7 @@
 </p:sld>
 </file>
 
-<file path=ppt/slides/slide16.xml><?xml version="1.0" encoding="utf-8"?>
+<file path=ppt/slides/slide17.xml><?xml version="1.0" encoding="utf-8"?>
 <p:sld xmlns:a="http://schemas.openxmlformats.org/drawingml/2006/main" xmlns:r="http://schemas.openxmlformats.org/officeDocument/2006/relationships" xmlns:p="http://schemas.openxmlformats.org/presentationml/2006/main">
   <p:cSld>
     <p:bg>
@@ -9220,7 +9689,7 @@
 </p:sld>
 </file>
 
-<file path=ppt/slides/slide17.xml><?xml version="1.0" encoding="utf-8"?>
+<file path=ppt/slides/slide18.xml><?xml version="1.0" encoding="utf-8"?>
 <p:sld xmlns:a="http://schemas.openxmlformats.org/drawingml/2006/main" xmlns:r="http://schemas.openxmlformats.org/officeDocument/2006/relationships" xmlns:p="http://schemas.openxmlformats.org/presentationml/2006/main">
   <p:cSld>
     <p:bg>
@@ -9465,7 +9934,7 @@
 </p:sld>
 </file>
 
-<file path=ppt/slides/slide18.xml><?xml version="1.0" encoding="utf-8"?>
+<file path=ppt/slides/slide19.xml><?xml version="1.0" encoding="utf-8"?>
 <p:sld xmlns:a="http://schemas.openxmlformats.org/drawingml/2006/main" xmlns:r="http://schemas.openxmlformats.org/officeDocument/2006/relationships" xmlns:p="http://schemas.openxmlformats.org/presentationml/2006/main">
   <p:cSld>
     <p:bg>
@@ -10106,7 +10575,245 @@
 </p:sld>
 </file>
 
-<file path=ppt/slides/slide19.xml><?xml version="1.0" encoding="utf-8"?>
+<file path=ppt/slides/slide2.xml><?xml version="1.0" encoding="utf-8"?>
+<p:sld xmlns:a="http://schemas.openxmlformats.org/drawingml/2006/main" xmlns:r="http://schemas.openxmlformats.org/officeDocument/2006/relationships" xmlns:p="http://schemas.openxmlformats.org/presentationml/2006/main">
+  <p:cSld>
+    <p:bg>
+      <p:bgPr>
+        <a:solidFill>
+          <a:schemeClr val="bg2">
+            <a:lumMod val="75000"/>
+          </a:schemeClr>
+        </a:solidFill>
+        <a:effectLst/>
+      </p:bgPr>
+    </p:bg>
+    <p:spTree>
+      <p:nvGrpSpPr>
+        <p:cNvPr id="1" name="Shape 146"/>
+        <p:cNvGrpSpPr/>
+        <p:nvPr/>
+      </p:nvGrpSpPr>
+      <p:grpSpPr>
+        <a:xfrm>
+          <a:off x="0" y="0"/>
+          <a:ext cx="0" cy="0"/>
+          <a:chOff x="0" y="0"/>
+          <a:chExt cx="0" cy="0"/>
+        </a:xfrm>
+      </p:grpSpPr>
+      <p:sp>
+        <p:nvSpPr>
+          <p:cNvPr id="147" name="Google Shape;147;p1"/>
+          <p:cNvSpPr txBox="1">
+            <a:spLocks noGrp="1"/>
+          </p:cNvSpPr>
+          <p:nvPr>
+            <p:ph type="ctrTitle"/>
+          </p:nvPr>
+        </p:nvSpPr>
+        <p:spPr>
+          <a:xfrm>
+            <a:off x="814848" y="1926814"/>
+            <a:ext cx="10333703" cy="1581508"/>
+          </a:xfrm>
+          <a:prstGeom prst="rect">
+            <a:avLst/>
+          </a:prstGeom>
+          <a:noFill/>
+          <a:ln>
+            <a:noFill/>
+          </a:ln>
+        </p:spPr>
+        <p:txBody>
+          <a:bodyPr spcFirstLastPara="1" wrap="square" lIns="91425" tIns="45700" rIns="91425" bIns="45700" anchor="b" anchorCtr="0">
+            <a:normAutofit fontScale="90000"/>
+          </a:bodyPr>
+          <a:lstStyle/>
+          <a:p>
+            <a:pPr marL="0" lvl="0" indent="0" rtl="0">
+              <a:lnSpc>
+                <a:spcPct val="100000"/>
+              </a:lnSpc>
+              <a:spcBef>
+                <a:spcPts val="0"/>
+              </a:spcBef>
+              <a:spcAft>
+                <a:spcPts val="0"/>
+              </a:spcAft>
+              <a:buClr>
+                <a:schemeClr val="lt2"/>
+              </a:buClr>
+              <a:buSzPts val="7200"/>
+              <a:buFont typeface="Century Gothic"/>
+              <a:buNone/>
+            </a:pPr>
+            <a:r>
+              <a:rPr lang="en-US" sz="4400" dirty="0">
+                <a:solidFill>
+                  <a:schemeClr val="bg1"/>
+                </a:solidFill>
+              </a:rPr>
+              <a:t>Using ChatGPT 4.0 To Migrate a VB.NET Windows Forms Application to a </a:t>
+            </a:r>
+            <a:br>
+              <a:rPr lang="en-US" sz="4400" dirty="0">
+                <a:solidFill>
+                  <a:schemeClr val="bg1"/>
+                </a:solidFill>
+              </a:rPr>
+            </a:br>
+            <a:r>
+              <a:rPr lang="en-US" sz="4400" dirty="0">
+                <a:solidFill>
+                  <a:schemeClr val="bg1"/>
+                </a:solidFill>
+              </a:rPr>
+              <a:t>C# Blazor Web Application</a:t>
+            </a:r>
+            <a:br>
+              <a:rPr lang="en-US" sz="4000" dirty="0">
+                <a:solidFill>
+                  <a:schemeClr val="bg1"/>
+                </a:solidFill>
+              </a:rPr>
+            </a:br>
+            <a:r>
+              <a:rPr lang="en-US" sz="3100" i="1" dirty="0">
+                <a:solidFill>
+                  <a:schemeClr val="bg1"/>
+                </a:solidFill>
+              </a:rPr>
+              <a:t>An Application Modernization Experiment </a:t>
+            </a:r>
+            <a:br>
+              <a:rPr lang="en-US" sz="3100" i="1" dirty="0">
+                <a:solidFill>
+                  <a:schemeClr val="bg1"/>
+                </a:solidFill>
+              </a:rPr>
+            </a:br>
+            <a:r>
+              <a:rPr lang="en-US" sz="3100" i="1" dirty="0">
+                <a:solidFill>
+                  <a:schemeClr val="bg1"/>
+                </a:solidFill>
+              </a:rPr>
+              <a:t>For Gap Mobilize</a:t>
+            </a:r>
+            <a:endParaRPr sz="3100" i="1" dirty="0">
+              <a:solidFill>
+                <a:schemeClr val="bg1"/>
+              </a:solidFill>
+            </a:endParaRPr>
+          </a:p>
+        </p:txBody>
+      </p:sp>
+      <p:sp>
+        <p:nvSpPr>
+          <p:cNvPr id="148" name="Google Shape;148;p1"/>
+          <p:cNvSpPr txBox="1">
+            <a:spLocks noGrp="1"/>
+          </p:cNvSpPr>
+          <p:nvPr>
+            <p:ph type="subTitle" idx="1"/>
+          </p:nvPr>
+        </p:nvSpPr>
+        <p:spPr>
+          <a:xfrm>
+            <a:off x="1409699" y="4721636"/>
+            <a:ext cx="9144000" cy="1058452"/>
+          </a:xfrm>
+          <a:prstGeom prst="rect">
+            <a:avLst/>
+          </a:prstGeom>
+          <a:noFill/>
+          <a:ln>
+            <a:noFill/>
+          </a:ln>
+        </p:spPr>
+        <p:txBody>
+          <a:bodyPr spcFirstLastPara="1" wrap="square" lIns="91425" tIns="45700" rIns="91425" bIns="45700" anchor="t" anchorCtr="0">
+            <a:normAutofit/>
+          </a:bodyPr>
+          <a:lstStyle/>
+          <a:p>
+            <a:pPr marL="0" lvl="0" indent="0" rtl="0">
+              <a:lnSpc>
+                <a:spcPct val="100000"/>
+              </a:lnSpc>
+              <a:spcBef>
+                <a:spcPts val="0"/>
+              </a:spcBef>
+              <a:spcAft>
+                <a:spcPts val="0"/>
+              </a:spcAft>
+              <a:buSzPts val="1600"/>
+              <a:buNone/>
+            </a:pPr>
+            <a:r>
+              <a:rPr lang="en-US" sz="1800" dirty="0">
+                <a:solidFill>
+                  <a:schemeClr val="bg1"/>
+                </a:solidFill>
+              </a:rPr>
+              <a:t>Prepared by Gregory Leake</a:t>
+            </a:r>
+            <a:br>
+              <a:rPr lang="en-US" sz="1800" dirty="0">
+                <a:solidFill>
+                  <a:schemeClr val="bg1"/>
+                </a:solidFill>
+              </a:rPr>
+            </a:br>
+            <a:r>
+              <a:rPr lang="en-US" sz="1800" dirty="0">
+                <a:solidFill>
+                  <a:schemeClr val="bg1"/>
+                </a:solidFill>
+              </a:rPr>
+              <a:t>For Gap Mobilize</a:t>
+            </a:r>
+          </a:p>
+          <a:p>
+            <a:pPr marL="0" lvl="0" indent="0" rtl="0">
+              <a:lnSpc>
+                <a:spcPct val="100000"/>
+              </a:lnSpc>
+              <a:spcBef>
+                <a:spcPts val="0"/>
+              </a:spcBef>
+              <a:spcAft>
+                <a:spcPts val="0"/>
+              </a:spcAft>
+              <a:buSzPts val="1600"/>
+              <a:buNone/>
+            </a:pPr>
+            <a:r>
+              <a:rPr lang="en-US" sz="1800" dirty="0">
+                <a:solidFill>
+                  <a:schemeClr val="bg1"/>
+                </a:solidFill>
+              </a:rPr>
+              <a:t>March 1, 2024</a:t>
+            </a:r>
+            <a:endParaRPr sz="1800" dirty="0">
+              <a:solidFill>
+                <a:schemeClr val="bg1"/>
+              </a:solidFill>
+            </a:endParaRPr>
+          </a:p>
+        </p:txBody>
+      </p:sp>
+    </p:spTree>
+  </p:cSld>
+  <p:clrMapOvr>
+    <a:masterClrMapping/>
+  </p:clrMapOvr>
+</p:sld>
+</file>
+
+<file path=ppt/slides/slide20.xml><?xml version="1.0" encoding="utf-8"?>
 <p:sld xmlns:a="http://schemas.openxmlformats.org/drawingml/2006/main" xmlns:r="http://schemas.openxmlformats.org/officeDocument/2006/relationships" xmlns:p="http://schemas.openxmlformats.org/presentationml/2006/main">
   <p:cSld>
     <p:bg>
@@ -10782,7 +11489,7 @@
 </p:sld>
 </file>
 
-<file path=ppt/slides/slide2.xml><?xml version="1.0" encoding="utf-8"?>
+<file path=ppt/slides/slide3.xml><?xml version="1.0" encoding="utf-8"?>
 <p:sld xmlns:a="http://schemas.openxmlformats.org/drawingml/2006/main" xmlns:r="http://schemas.openxmlformats.org/officeDocument/2006/relationships" xmlns:p="http://schemas.openxmlformats.org/presentationml/2006/main">
   <p:cSld>
     <p:bg>
@@ -11419,7 +12126,7 @@
 </p:sld>
 </file>
 
-<file path=ppt/slides/slide3.xml><?xml version="1.0" encoding="utf-8"?>
+<file path=ppt/slides/slide4.xml><?xml version="1.0" encoding="utf-8"?>
 <p:sld xmlns:a="http://schemas.openxmlformats.org/drawingml/2006/main" xmlns:r="http://schemas.openxmlformats.org/officeDocument/2006/relationships" xmlns:p="http://schemas.openxmlformats.org/presentationml/2006/main">
   <p:cSld>
     <p:bg>
@@ -11798,7 +12505,7 @@
 </p:sld>
 </file>
 
-<file path=ppt/slides/slide4.xml><?xml version="1.0" encoding="utf-8"?>
+<file path=ppt/slides/slide5.xml><?xml version="1.0" encoding="utf-8"?>
 <p:sld xmlns:a="http://schemas.openxmlformats.org/drawingml/2006/main" xmlns:r="http://schemas.openxmlformats.org/officeDocument/2006/relationships" xmlns:p="http://schemas.openxmlformats.org/presentationml/2006/main">
   <p:cSld>
     <p:bg>
@@ -12409,7 +13116,7 @@
 </p:sld>
 </file>
 
-<file path=ppt/slides/slide5.xml><?xml version="1.0" encoding="utf-8"?>
+<file path=ppt/slides/slide6.xml><?xml version="1.0" encoding="utf-8"?>
 <p:sld xmlns:a="http://schemas.openxmlformats.org/drawingml/2006/main" xmlns:r="http://schemas.openxmlformats.org/officeDocument/2006/relationships" xmlns:p="http://schemas.openxmlformats.org/presentationml/2006/main">
   <p:cSld>
     <p:bg>
@@ -13112,7 +13819,7 @@
 </p:sld>
 </file>
 
-<file path=ppt/slides/slide6.xml><?xml version="1.0" encoding="utf-8"?>
+<file path=ppt/slides/slide7.xml><?xml version="1.0" encoding="utf-8"?>
 <p:sld xmlns:a="http://schemas.openxmlformats.org/drawingml/2006/main" xmlns:r="http://schemas.openxmlformats.org/officeDocument/2006/relationships" xmlns:p="http://schemas.openxmlformats.org/presentationml/2006/main">
   <p:cSld>
     <p:bg>
@@ -13307,7 +14014,7 @@
 </p:sld>
 </file>
 
-<file path=ppt/slides/slide7.xml><?xml version="1.0" encoding="utf-8"?>
+<file path=ppt/slides/slide8.xml><?xml version="1.0" encoding="utf-8"?>
 <p:sld xmlns:a="http://schemas.openxmlformats.org/drawingml/2006/main" xmlns:r="http://schemas.openxmlformats.org/officeDocument/2006/relationships" xmlns:p="http://schemas.openxmlformats.org/presentationml/2006/main">
   <p:cSld>
     <p:bg>
@@ -13385,7 +14092,7 @@
 </p:sld>
 </file>
 
-<file path=ppt/slides/slide8.xml><?xml version="1.0" encoding="utf-8"?>
+<file path=ppt/slides/slide9.xml><?xml version="1.0" encoding="utf-8"?>
 <p:sld xmlns:a="http://schemas.openxmlformats.org/drawingml/2006/main" xmlns:r="http://schemas.openxmlformats.org/officeDocument/2006/relationships" xmlns:p="http://schemas.openxmlformats.org/presentationml/2006/main">
   <p:cSld>
     <p:bg>
@@ -14281,113 +14988,6 @@
 </p:sld>
 </file>
 
-<file path=ppt/slides/slide9.xml><?xml version="1.0" encoding="utf-8"?>
-<p:sld xmlns:a="http://schemas.openxmlformats.org/drawingml/2006/main" xmlns:r="http://schemas.openxmlformats.org/officeDocument/2006/relationships" xmlns:p="http://schemas.openxmlformats.org/presentationml/2006/main">
-  <p:cSld>
-    <p:bg>
-      <p:bgPr>
-        <a:solidFill>
-          <a:schemeClr val="bg2">
-            <a:lumMod val="75000"/>
-          </a:schemeClr>
-        </a:solidFill>
-        <a:effectLst/>
-      </p:bgPr>
-    </p:bg>
-    <p:spTree>
-      <p:nvGrpSpPr>
-        <p:cNvPr id="1" name=""/>
-        <p:cNvGrpSpPr/>
-        <p:nvPr/>
-      </p:nvGrpSpPr>
-      <p:grpSpPr>
-        <a:xfrm>
-          <a:off x="0" y="0"/>
-          <a:ext cx="0" cy="0"/>
-          <a:chOff x="0" y="0"/>
-          <a:chExt cx="0" cy="0"/>
-        </a:xfrm>
-      </p:grpSpPr>
-      <p:sp>
-        <p:nvSpPr>
-          <p:cNvPr id="2" name="Title 1">
-            <a:extLst>
-              <a:ext uri="{FF2B5EF4-FFF2-40B4-BE49-F238E27FC236}">
-                <a16:creationId xmlns:a16="http://schemas.microsoft.com/office/drawing/2014/main" id="{FBA0E16C-0374-CCEA-7410-1F8354D8619E}"/>
-              </a:ext>
-            </a:extLst>
-          </p:cNvPr>
-          <p:cNvSpPr>
-            <a:spLocks noGrp="1"/>
-          </p:cNvSpPr>
-          <p:nvPr>
-            <p:ph type="title"/>
-          </p:nvPr>
-        </p:nvSpPr>
-        <p:spPr>
-          <a:xfrm>
-            <a:off x="838200" y="216568"/>
-            <a:ext cx="10515600" cy="895784"/>
-          </a:xfrm>
-        </p:spPr>
-        <p:txBody>
-          <a:bodyPr/>
-          <a:lstStyle/>
-          <a:p>
-            <a:r>
-              <a:rPr lang="en-US" dirty="0">
-                <a:solidFill>
-                  <a:schemeClr val="bg1"/>
-                </a:solidFill>
-              </a:rPr>
-              <a:t>ChatGPT Interaction Types</a:t>
-            </a:r>
-          </a:p>
-        </p:txBody>
-      </p:sp>
-      <p:graphicFrame>
-        <p:nvGraphicFramePr>
-          <p:cNvPr id="3" name="Chart 2">
-            <a:extLst>
-              <a:ext uri="{FF2B5EF4-FFF2-40B4-BE49-F238E27FC236}">
-                <a16:creationId xmlns:a16="http://schemas.microsoft.com/office/drawing/2014/main" id="{E7A81D9D-5365-62DD-A230-388B6B80482B}"/>
-              </a:ext>
-            </a:extLst>
-          </p:cNvPr>
-          <p:cNvGraphicFramePr>
-            <a:graphicFrameLocks/>
-          </p:cNvGraphicFramePr>
-          <p:nvPr>
-            <p:extLst>
-              <p:ext uri="{D42A27DB-BD31-4B8C-83A1-F6EECF244321}">
-                <p14:modId xmlns:p14="http://schemas.microsoft.com/office/powerpoint/2010/main" val="3251586984"/>
-              </p:ext>
-            </p:extLst>
-          </p:nvPr>
-        </p:nvGraphicFramePr>
-        <p:xfrm>
-          <a:off x="319314" y="1112352"/>
-          <a:ext cx="11618685" cy="5529080"/>
-        </p:xfrm>
-        <a:graphic>
-          <a:graphicData uri="http://schemas.openxmlformats.org/drawingml/2006/chart">
-            <c:chart xmlns:c="http://schemas.openxmlformats.org/drawingml/2006/chart" xmlns:r="http://schemas.openxmlformats.org/officeDocument/2006/relationships" r:id="rId2"/>
-          </a:graphicData>
-        </a:graphic>
-      </p:graphicFrame>
-    </p:spTree>
-    <p:extLst>
-      <p:ext uri="{BB962C8B-B14F-4D97-AF65-F5344CB8AC3E}">
-        <p14:creationId xmlns:p14="http://schemas.microsoft.com/office/powerpoint/2010/main" val="1680997173"/>
-      </p:ext>
-    </p:extLst>
-  </p:cSld>
-  <p:clrMapOvr>
-    <a:masterClrMapping/>
-  </p:clrMapOvr>
-</p:sld>
-</file>
-
 <file path=ppt/theme/theme1.xml><?xml version="1.0" encoding="utf-8"?>
 <a:theme xmlns:a="http://schemas.openxmlformats.org/drawingml/2006/main" name="Office 2013 - 2022 Theme">
   <a:themeElements>

</xml_diff>